<commit_message>
Added two-part model analysis of ELISA.
</commit_message>
<xml_diff>
--- a/Output/Lu COVID19 Report/Luigi Brunetti COVID19 Data Analysis V2.pptx
+++ b/Output/Lu COVID19 Report/Luigi Brunetti COVID19 Data Analysis V2.pptx
@@ -5,17 +5,21 @@
     <p:sldMasterId id="2147483648" r:id="rId1"/>
   </p:sldMasterIdLst>
   <p:notesMasterIdLst>
-    <p:notesMasterId r:id="rId10"/>
+    <p:notesMasterId r:id="rId14"/>
   </p:notesMasterIdLst>
   <p:sldIdLst>
     <p:sldId id="257" r:id="rId2"/>
-    <p:sldId id="258" r:id="rId3"/>
-    <p:sldId id="271" r:id="rId4"/>
-    <p:sldId id="269" r:id="rId5"/>
-    <p:sldId id="270" r:id="rId6"/>
-    <p:sldId id="266" r:id="rId7"/>
-    <p:sldId id="265" r:id="rId8"/>
-    <p:sldId id="268" r:id="rId9"/>
+    <p:sldId id="272" r:id="rId3"/>
+    <p:sldId id="258" r:id="rId4"/>
+    <p:sldId id="271" r:id="rId5"/>
+    <p:sldId id="269" r:id="rId6"/>
+    <p:sldId id="270" r:id="rId7"/>
+    <p:sldId id="266" r:id="rId8"/>
+    <p:sldId id="265" r:id="rId9"/>
+    <p:sldId id="268" r:id="rId10"/>
+    <p:sldId id="273" r:id="rId11"/>
+    <p:sldId id="274" r:id="rId12"/>
+    <p:sldId id="275" r:id="rId13"/>
   </p:sldIdLst>
   <p:sldSz cx="12192000" cy="6858000"/>
   <p:notesSz cx="6858000" cy="9144000"/>
@@ -156,6 +160,162 @@
       </pc:sldChg>
     </pc:docChg>
   </pc:docChgLst>
+  <pc:docChgLst>
+    <pc:chgData name="Sargsyan, Davit [JRDUS]" userId="3e31b559-84b2-4844-9a39-5ca6ce0fe171" providerId="ADAL" clId="{3B6DF2FA-0277-41CA-9100-6A670699BC98}"/>
+    <pc:docChg chg="undo custSel addSld modSld">
+      <pc:chgData name="Sargsyan, Davit [JRDUS]" userId="3e31b559-84b2-4844-9a39-5ca6ce0fe171" providerId="ADAL" clId="{3B6DF2FA-0277-41CA-9100-6A670699BC98}" dt="2024-03-14T20:25:02.270" v="410" actId="1076"/>
+      <pc:docMkLst>
+        <pc:docMk/>
+      </pc:docMkLst>
+      <pc:sldChg chg="modSp mod">
+        <pc:chgData name="Sargsyan, Davit [JRDUS]" userId="3e31b559-84b2-4844-9a39-5ca6ce0fe171" providerId="ADAL" clId="{3B6DF2FA-0277-41CA-9100-6A670699BC98}" dt="2024-03-10T18:26:52.236" v="108" actId="20577"/>
+        <pc:sldMkLst>
+          <pc:docMk/>
+          <pc:sldMk cId="3754857507" sldId="257"/>
+        </pc:sldMkLst>
+        <pc:spChg chg="mod">
+          <ac:chgData name="Sargsyan, Davit [JRDUS]" userId="3e31b559-84b2-4844-9a39-5ca6ce0fe171" providerId="ADAL" clId="{3B6DF2FA-0277-41CA-9100-6A670699BC98}" dt="2024-03-10T18:26:52.236" v="108" actId="20577"/>
+          <ac:spMkLst>
+            <pc:docMk/>
+            <pc:sldMk cId="3754857507" sldId="257"/>
+            <ac:spMk id="3" creationId="{BF58E07E-8576-1CA8-92AC-93ECFB33B9A2}"/>
+          </ac:spMkLst>
+        </pc:spChg>
+      </pc:sldChg>
+      <pc:sldChg chg="addSp modSp new mod">
+        <pc:chgData name="Sargsyan, Davit [JRDUS]" userId="3e31b559-84b2-4844-9a39-5ca6ce0fe171" providerId="ADAL" clId="{3B6DF2FA-0277-41CA-9100-6A670699BC98}" dt="2024-03-10T19:02:01.005" v="367" actId="20577"/>
+        <pc:sldMkLst>
+          <pc:docMk/>
+          <pc:sldMk cId="783287949" sldId="272"/>
+        </pc:sldMkLst>
+        <pc:spChg chg="mod">
+          <ac:chgData name="Sargsyan, Davit [JRDUS]" userId="3e31b559-84b2-4844-9a39-5ca6ce0fe171" providerId="ADAL" clId="{3B6DF2FA-0277-41CA-9100-6A670699BC98}" dt="2024-03-10T18:31:45.088" v="178" actId="1076"/>
+          <ac:spMkLst>
+            <pc:docMk/>
+            <pc:sldMk cId="783287949" sldId="272"/>
+            <ac:spMk id="2" creationId="{AE494CCF-CA92-2700-40A3-004438792891}"/>
+          </ac:spMkLst>
+        </pc:spChg>
+        <pc:spChg chg="add mod">
+          <ac:chgData name="Sargsyan, Davit [JRDUS]" userId="3e31b559-84b2-4844-9a39-5ca6ce0fe171" providerId="ADAL" clId="{3B6DF2FA-0277-41CA-9100-6A670699BC98}" dt="2024-03-10T19:02:01.005" v="367" actId="20577"/>
+          <ac:spMkLst>
+            <pc:docMk/>
+            <pc:sldMk cId="783287949" sldId="272"/>
+            <ac:spMk id="4" creationId="{83825DBC-E62B-9CDC-322F-B0BA3E24C906}"/>
+          </ac:spMkLst>
+        </pc:spChg>
+        <pc:spChg chg="add mod">
+          <ac:chgData name="Sargsyan, Davit [JRDUS]" userId="3e31b559-84b2-4844-9a39-5ca6ce0fe171" providerId="ADAL" clId="{3B6DF2FA-0277-41CA-9100-6A670699BC98}" dt="2024-03-10T18:31:26.411" v="176" actId="571"/>
+          <ac:spMkLst>
+            <pc:docMk/>
+            <pc:sldMk cId="783287949" sldId="272"/>
+            <ac:spMk id="5" creationId="{5E45509F-99CF-1917-5531-C49F37B2E5F8}"/>
+          </ac:spMkLst>
+        </pc:spChg>
+        <pc:spChg chg="add mod">
+          <ac:chgData name="Sargsyan, Davit [JRDUS]" userId="3e31b559-84b2-4844-9a39-5ca6ce0fe171" providerId="ADAL" clId="{3B6DF2FA-0277-41CA-9100-6A670699BC98}" dt="2024-03-10T18:31:26.411" v="176" actId="571"/>
+          <ac:spMkLst>
+            <pc:docMk/>
+            <pc:sldMk cId="783287949" sldId="272"/>
+            <ac:spMk id="6" creationId="{5310EB31-D7AB-239B-7B01-DC21D38ACBDB}"/>
+          </ac:spMkLst>
+        </pc:spChg>
+        <pc:spChg chg="add mod">
+          <ac:chgData name="Sargsyan, Davit [JRDUS]" userId="3e31b559-84b2-4844-9a39-5ca6ce0fe171" providerId="ADAL" clId="{3B6DF2FA-0277-41CA-9100-6A670699BC98}" dt="2024-03-10T18:31:26.411" v="176" actId="571"/>
+          <ac:spMkLst>
+            <pc:docMk/>
+            <pc:sldMk cId="783287949" sldId="272"/>
+            <ac:spMk id="7" creationId="{676ACAF0-2F60-C673-281D-B75663558977}"/>
+          </ac:spMkLst>
+        </pc:spChg>
+      </pc:sldChg>
+      <pc:sldChg chg="addSp delSp new">
+        <pc:chgData name="Sargsyan, Davit [JRDUS]" userId="3e31b559-84b2-4844-9a39-5ca6ce0fe171" providerId="ADAL" clId="{3B6DF2FA-0277-41CA-9100-6A670699BC98}" dt="2024-03-14T19:51:29.315" v="371"/>
+        <pc:sldMkLst>
+          <pc:docMk/>
+          <pc:sldMk cId="2949110669" sldId="273"/>
+        </pc:sldMkLst>
+        <pc:spChg chg="add del">
+          <ac:chgData name="Sargsyan, Davit [JRDUS]" userId="3e31b559-84b2-4844-9a39-5ca6ce0fe171" providerId="ADAL" clId="{3B6DF2FA-0277-41CA-9100-6A670699BC98}" dt="2024-03-14T19:51:29.265" v="370"/>
+          <ac:spMkLst>
+            <pc:docMk/>
+            <pc:sldMk cId="2949110669" sldId="273"/>
+            <ac:spMk id="3" creationId="{E07C23B4-7358-AD60-F7C4-8937E26D78F3}"/>
+          </ac:spMkLst>
+        </pc:spChg>
+        <pc:picChg chg="add">
+          <ac:chgData name="Sargsyan, Davit [JRDUS]" userId="3e31b559-84b2-4844-9a39-5ca6ce0fe171" providerId="ADAL" clId="{3B6DF2FA-0277-41CA-9100-6A670699BC98}" dt="2024-03-14T19:51:29.315" v="371"/>
+          <ac:picMkLst>
+            <pc:docMk/>
+            <pc:sldMk cId="2949110669" sldId="273"/>
+            <ac:picMk id="4" creationId="{BFE01F7E-871D-69EC-5065-9568B22FC27C}"/>
+          </ac:picMkLst>
+        </pc:picChg>
+      </pc:sldChg>
+      <pc:sldChg chg="addSp delSp modSp new mod">
+        <pc:chgData name="Sargsyan, Davit [JRDUS]" userId="3e31b559-84b2-4844-9a39-5ca6ce0fe171" providerId="ADAL" clId="{3B6DF2FA-0277-41CA-9100-6A670699BC98}" dt="2024-03-14T20:24:25.612" v="398" actId="1036"/>
+        <pc:sldMkLst>
+          <pc:docMk/>
+          <pc:sldMk cId="2643318310" sldId="274"/>
+        </pc:sldMkLst>
+        <pc:spChg chg="add del">
+          <ac:chgData name="Sargsyan, Davit [JRDUS]" userId="3e31b559-84b2-4844-9a39-5ca6ce0fe171" providerId="ADAL" clId="{3B6DF2FA-0277-41CA-9100-6A670699BC98}" dt="2024-03-14T20:01:19.718" v="374"/>
+          <ac:spMkLst>
+            <pc:docMk/>
+            <pc:sldMk cId="2643318310" sldId="274"/>
+            <ac:spMk id="3" creationId="{D499B07E-3DC9-43A1-0AF5-3DE6F1FE8407}"/>
+          </ac:spMkLst>
+        </pc:spChg>
+        <pc:spChg chg="add mod">
+          <ac:chgData name="Sargsyan, Davit [JRDUS]" userId="3e31b559-84b2-4844-9a39-5ca6ce0fe171" providerId="ADAL" clId="{3B6DF2FA-0277-41CA-9100-6A670699BC98}" dt="2024-03-14T20:01:54.877" v="385" actId="20577"/>
+          <ac:spMkLst>
+            <pc:docMk/>
+            <pc:sldMk cId="2643318310" sldId="274"/>
+            <ac:spMk id="5" creationId="{B7856085-290A-B372-8852-D03C82024C26}"/>
+          </ac:spMkLst>
+        </pc:spChg>
+        <pc:picChg chg="add mod">
+          <ac:chgData name="Sargsyan, Davit [JRDUS]" userId="3e31b559-84b2-4844-9a39-5ca6ce0fe171" providerId="ADAL" clId="{3B6DF2FA-0277-41CA-9100-6A670699BC98}" dt="2024-03-14T20:24:25.612" v="398" actId="1036"/>
+          <ac:picMkLst>
+            <pc:docMk/>
+            <pc:sldMk cId="2643318310" sldId="274"/>
+            <ac:picMk id="4" creationId="{26BB6039-7BA0-0EC1-7F60-30D3B20440ED}"/>
+          </ac:picMkLst>
+        </pc:picChg>
+      </pc:sldChg>
+      <pc:sldChg chg="addSp modSp add mod">
+        <pc:chgData name="Sargsyan, Davit [JRDUS]" userId="3e31b559-84b2-4844-9a39-5ca6ce0fe171" providerId="ADAL" clId="{3B6DF2FA-0277-41CA-9100-6A670699BC98}" dt="2024-03-14T20:25:02.270" v="410" actId="1076"/>
+        <pc:sldMkLst>
+          <pc:docMk/>
+          <pc:sldMk cId="1765049063" sldId="275"/>
+        </pc:sldMkLst>
+        <pc:spChg chg="mod">
+          <ac:chgData name="Sargsyan, Davit [JRDUS]" userId="3e31b559-84b2-4844-9a39-5ca6ce0fe171" providerId="ADAL" clId="{3B6DF2FA-0277-41CA-9100-6A670699BC98}" dt="2024-03-14T20:04:54.610" v="396" actId="20577"/>
+          <ac:spMkLst>
+            <pc:docMk/>
+            <pc:sldMk cId="1765049063" sldId="275"/>
+            <ac:spMk id="5" creationId="{B7856085-290A-B372-8852-D03C82024C26}"/>
+          </ac:spMkLst>
+        </pc:spChg>
+        <pc:picChg chg="add mod">
+          <ac:chgData name="Sargsyan, Davit [JRDUS]" userId="3e31b559-84b2-4844-9a39-5ca6ce0fe171" providerId="ADAL" clId="{3B6DF2FA-0277-41CA-9100-6A670699BC98}" dt="2024-03-14T20:25:00.693" v="409" actId="1076"/>
+          <ac:picMkLst>
+            <pc:docMk/>
+            <pc:sldMk cId="1765049063" sldId="275"/>
+            <ac:picMk id="3" creationId="{56168612-D945-774C-B1DF-BBA398371C3A}"/>
+          </ac:picMkLst>
+        </pc:picChg>
+        <pc:picChg chg="mod">
+          <ac:chgData name="Sargsyan, Davit [JRDUS]" userId="3e31b559-84b2-4844-9a39-5ca6ce0fe171" providerId="ADAL" clId="{3B6DF2FA-0277-41CA-9100-6A670699BC98}" dt="2024-03-14T20:25:02.270" v="410" actId="1076"/>
+          <ac:picMkLst>
+            <pc:docMk/>
+            <pc:sldMk cId="1765049063" sldId="275"/>
+            <ac:picMk id="4" creationId="{26BB6039-7BA0-0EC1-7F60-30D3B20440ED}"/>
+          </ac:picMkLst>
+        </pc:picChg>
+      </pc:sldChg>
+    </pc:docChg>
+  </pc:docChgLst>
 </pc:chgInfo>
 </file>
 
@@ -241,7 +401,7 @@
           <a:p>
             <a:fld id="{D9AFCF07-550B-4752-B078-9051B164DE1B}" type="datetimeFigureOut">
               <a:rPr lang="en-US" smtClean="0"/>
-              <a:t>12/28/2023</a:t>
+              <a:t>3/14/2024</a:t>
             </a:fld>
             <a:endParaRPr lang="en-US"/>
           </a:p>
@@ -655,7 +815,7 @@
           <a:p>
             <a:fld id="{DA7CB209-DC30-4A3D-ACBB-7666F3EEF344}" type="datetime1">
               <a:rPr lang="en-US" smtClean="0"/>
-              <a:t>12/28/2023</a:t>
+              <a:t>3/14/2024</a:t>
             </a:fld>
             <a:endParaRPr lang="en-US"/>
           </a:p>
@@ -853,7 +1013,7 @@
           <a:p>
             <a:fld id="{15D9FB04-700E-4ADD-84C1-2AE9D61CB328}" type="datetime1">
               <a:rPr lang="en-US" smtClean="0"/>
-              <a:t>12/28/2023</a:t>
+              <a:t>3/14/2024</a:t>
             </a:fld>
             <a:endParaRPr lang="en-US"/>
           </a:p>
@@ -1061,7 +1221,7 @@
           <a:p>
             <a:fld id="{B56F5187-F3DF-48D8-91A3-32835E5FC5AC}" type="datetime1">
               <a:rPr lang="en-US" smtClean="0"/>
-              <a:t>12/28/2023</a:t>
+              <a:t>3/14/2024</a:t>
             </a:fld>
             <a:endParaRPr lang="en-US"/>
           </a:p>
@@ -1259,7 +1419,7 @@
           <a:p>
             <a:fld id="{3FA5BE93-5525-4787-84CA-9A888163F5A3}" type="datetime1">
               <a:rPr lang="en-US" smtClean="0"/>
-              <a:t>12/28/2023</a:t>
+              <a:t>3/14/2024</a:t>
             </a:fld>
             <a:endParaRPr lang="en-US"/>
           </a:p>
@@ -1534,7 +1694,7 @@
           <a:p>
             <a:fld id="{99166F26-3536-4D6F-ACCE-0F9C91BCC12F}" type="datetime1">
               <a:rPr lang="en-US" smtClean="0"/>
-              <a:t>12/28/2023</a:t>
+              <a:t>3/14/2024</a:t>
             </a:fld>
             <a:endParaRPr lang="en-US"/>
           </a:p>
@@ -1799,7 +1959,7 @@
           <a:p>
             <a:fld id="{9A1460BA-D6CB-4750-844E-E331874BED43}" type="datetime1">
               <a:rPr lang="en-US" smtClean="0"/>
-              <a:t>12/28/2023</a:t>
+              <a:t>3/14/2024</a:t>
             </a:fld>
             <a:endParaRPr lang="en-US"/>
           </a:p>
@@ -2211,7 +2371,7 @@
           <a:p>
             <a:fld id="{E3DA20E5-2BE4-4788-B912-BE964BD851C8}" type="datetime1">
               <a:rPr lang="en-US" smtClean="0"/>
-              <a:t>12/28/2023</a:t>
+              <a:t>3/14/2024</a:t>
             </a:fld>
             <a:endParaRPr lang="en-US"/>
           </a:p>
@@ -2352,7 +2512,7 @@
           <a:p>
             <a:fld id="{CD7FC29D-352E-4C39-B2E0-907116D2AF61}" type="datetime1">
               <a:rPr lang="en-US" smtClean="0"/>
-              <a:t>12/28/2023</a:t>
+              <a:t>3/14/2024</a:t>
             </a:fld>
             <a:endParaRPr lang="en-US"/>
           </a:p>
@@ -2465,7 +2625,7 @@
           <a:p>
             <a:fld id="{59D0F947-D974-46D5-B749-3A1FF5F7BD0E}" type="datetime1">
               <a:rPr lang="en-US" smtClean="0"/>
-              <a:t>12/28/2023</a:t>
+              <a:t>3/14/2024</a:t>
             </a:fld>
             <a:endParaRPr lang="en-US"/>
           </a:p>
@@ -2776,7 +2936,7 @@
           <a:p>
             <a:fld id="{D7EABC54-17F6-432F-9A87-B88F0A0B888A}" type="datetime1">
               <a:rPr lang="en-US" smtClean="0"/>
-              <a:t>12/28/2023</a:t>
+              <a:t>3/14/2024</a:t>
             </a:fld>
             <a:endParaRPr lang="en-US"/>
           </a:p>
@@ -3064,7 +3224,7 @@
           <a:p>
             <a:fld id="{B17CFDFA-ED77-4C51-AC9F-81E88D0CD463}" type="datetime1">
               <a:rPr lang="en-US" smtClean="0"/>
-              <a:t>12/28/2023</a:t>
+              <a:t>3/14/2024</a:t>
             </a:fld>
             <a:endParaRPr lang="en-US"/>
           </a:p>
@@ -3305,7 +3465,7 @@
           <a:p>
             <a:fld id="{85ABF500-A2E5-45B8-A496-4CC4D4A0D4A1}" type="datetime1">
               <a:rPr lang="en-US" smtClean="0"/>
-              <a:t>12/28/2023</a:t>
+              <a:t>3/14/2024</a:t>
             </a:fld>
             <a:endParaRPr lang="en-US"/>
           </a:p>
@@ -3769,35 +3929,37 @@
         </p:nvSpPr>
         <p:spPr/>
         <p:txBody>
-          <a:bodyPr/>
+          <a:bodyPr>
+            <a:normAutofit/>
+          </a:bodyPr>
           <a:lstStyle/>
           <a:p>
             <a:pPr algn="r"/>
             <a:r>
               <a:rPr lang="en-US" dirty="0"/>
-              <a:t>PI: Dr. Luigi Brunetti</a:t>
+              <a:t>PI: Luigi Brunetti and Marshall Yuan</a:t>
             </a:r>
           </a:p>
           <a:p>
             <a:pPr algn="r"/>
             <a:r>
               <a:rPr lang="en-US" dirty="0"/>
-              <a:t>Stats: Davit, </a:t>
+              <a:t>Stats: Davit </a:t>
             </a:r>
             <a:r>
               <a:rPr lang="en-US" dirty="0" err="1"/>
-              <a:t>Vahe</a:t>
+              <a:t>Davit</a:t>
             </a:r>
             <a:r>
               <a:rPr lang="en-US" dirty="0"/>
-              <a:t> and Prof. Cabrera</a:t>
+              <a:t>, Vahe Nersisyan and Javier Cabrera</a:t>
             </a:r>
           </a:p>
           <a:p>
             <a:pPr algn="r"/>
             <a:r>
               <a:rPr lang="en-US" dirty="0"/>
-              <a:t>Last Edited: September 22, 2023</a:t>
+              <a:t>Last Edited: March 10, 2024</a:t>
             </a:r>
           </a:p>
         </p:txBody>
@@ -3815,7 +3977,737 @@
 </p:sld>
 </file>
 
+<file path=ppt/slides/slide10.xml><?xml version="1.0" encoding="utf-8"?>
+<p:sld xmlns:a="http://schemas.openxmlformats.org/drawingml/2006/main" xmlns:r="http://schemas.openxmlformats.org/officeDocument/2006/relationships" xmlns:p="http://schemas.openxmlformats.org/presentationml/2006/main">
+  <p:cSld>
+    <p:spTree>
+      <p:nvGrpSpPr>
+        <p:cNvPr id="1" name=""/>
+        <p:cNvGrpSpPr/>
+        <p:nvPr/>
+      </p:nvGrpSpPr>
+      <p:grpSpPr>
+        <a:xfrm>
+          <a:off x="0" y="0"/>
+          <a:ext cx="0" cy="0"/>
+          <a:chOff x="0" y="0"/>
+          <a:chExt cx="0" cy="0"/>
+        </a:xfrm>
+      </p:grpSpPr>
+      <p:sp>
+        <p:nvSpPr>
+          <p:cNvPr id="2" name="Slide Number Placeholder 1">
+            <a:extLst>
+              <a:ext uri="{FF2B5EF4-FFF2-40B4-BE49-F238E27FC236}">
+                <a16:creationId xmlns:a16="http://schemas.microsoft.com/office/drawing/2014/main" id="{903DB45F-4388-0395-1D3A-9AD340985FDF}"/>
+              </a:ext>
+            </a:extLst>
+          </p:cNvPr>
+          <p:cNvSpPr>
+            <a:spLocks noGrp="1"/>
+          </p:cNvSpPr>
+          <p:nvPr>
+            <p:ph type="sldNum" sz="quarter" idx="12"/>
+          </p:nvPr>
+        </p:nvSpPr>
+        <p:spPr/>
+        <p:txBody>
+          <a:bodyPr/>
+          <a:lstStyle/>
+          <a:p>
+            <a:fld id="{FB3EEA06-64CD-4E3F-A4B1-2F19568F86B8}" type="slidenum">
+              <a:rPr lang="en-US" smtClean="0"/>
+              <a:t>10</a:t>
+            </a:fld>
+            <a:endParaRPr lang="en-US"/>
+          </a:p>
+        </p:txBody>
+      </p:sp>
+      <p:pic>
+        <p:nvPicPr>
+          <p:cNvPr id="4" name="Picture 3">
+            <a:extLst>
+              <a:ext uri="{FF2B5EF4-FFF2-40B4-BE49-F238E27FC236}">
+                <a16:creationId xmlns:a16="http://schemas.microsoft.com/office/drawing/2014/main" id="{BFE01F7E-871D-69EC-5065-9568B22FC27C}"/>
+              </a:ext>
+            </a:extLst>
+          </p:cNvPr>
+          <p:cNvPicPr>
+            <a:picLocks noChangeAspect="1"/>
+          </p:cNvPicPr>
+          <p:nvPr/>
+        </p:nvPicPr>
+        <p:blipFill>
+          <a:blip r:embed="rId2"/>
+          <a:stretch>
+            <a:fillRect/>
+          </a:stretch>
+        </p:blipFill>
+        <p:spPr>
+          <a:xfrm>
+            <a:off x="2667000" y="0"/>
+            <a:ext cx="6858000" cy="6858000"/>
+          </a:xfrm>
+          <a:prstGeom prst="rect">
+            <a:avLst/>
+          </a:prstGeom>
+        </p:spPr>
+      </p:pic>
+    </p:spTree>
+    <p:extLst>
+      <p:ext uri="{BB962C8B-B14F-4D97-AF65-F5344CB8AC3E}">
+        <p14:creationId xmlns:p14="http://schemas.microsoft.com/office/powerpoint/2010/main" val="2949110669"/>
+      </p:ext>
+    </p:extLst>
+  </p:cSld>
+  <p:clrMapOvr>
+    <a:masterClrMapping/>
+  </p:clrMapOvr>
+</p:sld>
+</file>
+
+<file path=ppt/slides/slide11.xml><?xml version="1.0" encoding="utf-8"?>
+<p:sld xmlns:a="http://schemas.openxmlformats.org/drawingml/2006/main" xmlns:r="http://schemas.openxmlformats.org/officeDocument/2006/relationships" xmlns:p="http://schemas.openxmlformats.org/presentationml/2006/main">
+  <p:cSld>
+    <p:spTree>
+      <p:nvGrpSpPr>
+        <p:cNvPr id="1" name=""/>
+        <p:cNvGrpSpPr/>
+        <p:nvPr/>
+      </p:nvGrpSpPr>
+      <p:grpSpPr>
+        <a:xfrm>
+          <a:off x="0" y="0"/>
+          <a:ext cx="0" cy="0"/>
+          <a:chOff x="0" y="0"/>
+          <a:chExt cx="0" cy="0"/>
+        </a:xfrm>
+      </p:grpSpPr>
+      <p:sp>
+        <p:nvSpPr>
+          <p:cNvPr id="2" name="Slide Number Placeholder 1">
+            <a:extLst>
+              <a:ext uri="{FF2B5EF4-FFF2-40B4-BE49-F238E27FC236}">
+                <a16:creationId xmlns:a16="http://schemas.microsoft.com/office/drawing/2014/main" id="{ACBCBF8D-45FB-D068-994E-460838844D37}"/>
+              </a:ext>
+            </a:extLst>
+          </p:cNvPr>
+          <p:cNvSpPr>
+            <a:spLocks noGrp="1"/>
+          </p:cNvSpPr>
+          <p:nvPr>
+            <p:ph type="sldNum" sz="quarter" idx="12"/>
+          </p:nvPr>
+        </p:nvSpPr>
+        <p:spPr/>
+        <p:txBody>
+          <a:bodyPr/>
+          <a:lstStyle/>
+          <a:p>
+            <a:fld id="{FB3EEA06-64CD-4E3F-A4B1-2F19568F86B8}" type="slidenum">
+              <a:rPr lang="en-US" smtClean="0"/>
+              <a:t>11</a:t>
+            </a:fld>
+            <a:endParaRPr lang="en-US"/>
+          </a:p>
+        </p:txBody>
+      </p:sp>
+      <p:pic>
+        <p:nvPicPr>
+          <p:cNvPr id="4" name="Picture 3">
+            <a:extLst>
+              <a:ext uri="{FF2B5EF4-FFF2-40B4-BE49-F238E27FC236}">
+                <a16:creationId xmlns:a16="http://schemas.microsoft.com/office/drawing/2014/main" id="{26BB6039-7BA0-0EC1-7F60-30D3B20440ED}"/>
+              </a:ext>
+            </a:extLst>
+          </p:cNvPr>
+          <p:cNvPicPr>
+            <a:picLocks noChangeAspect="1"/>
+          </p:cNvPicPr>
+          <p:nvPr/>
+        </p:nvPicPr>
+        <p:blipFill>
+          <a:blip r:embed="rId2"/>
+          <a:stretch>
+            <a:fillRect/>
+          </a:stretch>
+        </p:blipFill>
+        <p:spPr>
+          <a:xfrm>
+            <a:off x="4495800" y="9236"/>
+            <a:ext cx="6858000" cy="6858000"/>
+          </a:xfrm>
+          <a:prstGeom prst="rect">
+            <a:avLst/>
+          </a:prstGeom>
+        </p:spPr>
+      </p:pic>
+      <p:sp>
+        <p:nvSpPr>
+          <p:cNvPr id="5" name="TextBox 4">
+            <a:extLst>
+              <a:ext uri="{FF2B5EF4-FFF2-40B4-BE49-F238E27FC236}">
+                <a16:creationId xmlns:a16="http://schemas.microsoft.com/office/drawing/2014/main" id="{B7856085-290A-B372-8852-D03C82024C26}"/>
+              </a:ext>
+            </a:extLst>
+          </p:cNvPr>
+          <p:cNvSpPr txBox="1"/>
+          <p:nvPr/>
+        </p:nvSpPr>
+        <p:spPr>
+          <a:xfrm>
+            <a:off x="2090057" y="1848897"/>
+            <a:ext cx="881010" cy="369332"/>
+          </a:xfrm>
+          <a:prstGeom prst="rect">
+            <a:avLst/>
+          </a:prstGeom>
+          <a:noFill/>
+        </p:spPr>
+        <p:txBody>
+          <a:bodyPr wrap="none" rtlCol="0">
+            <a:spAutoFit/>
+          </a:bodyPr>
+          <a:lstStyle/>
+          <a:p>
+            <a:r>
+              <a:rPr lang="en-US" dirty="0"/>
+              <a:t>Logistic</a:t>
+            </a:r>
+          </a:p>
+        </p:txBody>
+      </p:sp>
+    </p:spTree>
+    <p:extLst>
+      <p:ext uri="{BB962C8B-B14F-4D97-AF65-F5344CB8AC3E}">
+        <p14:creationId xmlns:p14="http://schemas.microsoft.com/office/powerpoint/2010/main" val="2643318310"/>
+      </p:ext>
+    </p:extLst>
+  </p:cSld>
+  <p:clrMapOvr>
+    <a:masterClrMapping/>
+  </p:clrMapOvr>
+</p:sld>
+</file>
+
+<file path=ppt/slides/slide12.xml><?xml version="1.0" encoding="utf-8"?>
+<p:sld xmlns:a="http://schemas.openxmlformats.org/drawingml/2006/main" xmlns:r="http://schemas.openxmlformats.org/officeDocument/2006/relationships" xmlns:p="http://schemas.openxmlformats.org/presentationml/2006/main">
+  <p:cSld>
+    <p:spTree>
+      <p:nvGrpSpPr>
+        <p:cNvPr id="1" name=""/>
+        <p:cNvGrpSpPr/>
+        <p:nvPr/>
+      </p:nvGrpSpPr>
+      <p:grpSpPr>
+        <a:xfrm>
+          <a:off x="0" y="0"/>
+          <a:ext cx="0" cy="0"/>
+          <a:chOff x="0" y="0"/>
+          <a:chExt cx="0" cy="0"/>
+        </a:xfrm>
+      </p:grpSpPr>
+      <p:sp>
+        <p:nvSpPr>
+          <p:cNvPr id="2" name="Slide Number Placeholder 1">
+            <a:extLst>
+              <a:ext uri="{FF2B5EF4-FFF2-40B4-BE49-F238E27FC236}">
+                <a16:creationId xmlns:a16="http://schemas.microsoft.com/office/drawing/2014/main" id="{ACBCBF8D-45FB-D068-994E-460838844D37}"/>
+              </a:ext>
+            </a:extLst>
+          </p:cNvPr>
+          <p:cNvSpPr>
+            <a:spLocks noGrp="1"/>
+          </p:cNvSpPr>
+          <p:nvPr>
+            <p:ph type="sldNum" sz="quarter" idx="12"/>
+          </p:nvPr>
+        </p:nvSpPr>
+        <p:spPr/>
+        <p:txBody>
+          <a:bodyPr/>
+          <a:lstStyle/>
+          <a:p>
+            <a:fld id="{FB3EEA06-64CD-4E3F-A4B1-2F19568F86B8}" type="slidenum">
+              <a:rPr lang="en-US" smtClean="0"/>
+              <a:t>12</a:t>
+            </a:fld>
+            <a:endParaRPr lang="en-US"/>
+          </a:p>
+        </p:txBody>
+      </p:sp>
+      <p:pic>
+        <p:nvPicPr>
+          <p:cNvPr id="4" name="Picture 3">
+            <a:extLst>
+              <a:ext uri="{FF2B5EF4-FFF2-40B4-BE49-F238E27FC236}">
+                <a16:creationId xmlns:a16="http://schemas.microsoft.com/office/drawing/2014/main" id="{26BB6039-7BA0-0EC1-7F60-30D3B20440ED}"/>
+              </a:ext>
+            </a:extLst>
+          </p:cNvPr>
+          <p:cNvPicPr>
+            <a:picLocks noChangeAspect="1"/>
+          </p:cNvPicPr>
+          <p:nvPr/>
+        </p:nvPicPr>
+        <p:blipFill>
+          <a:blip r:embed="rId2">
+            <a:extLst>
+              <a:ext uri="{28A0092B-C50C-407E-A947-70E740481C1C}">
+                <a14:useLocalDpi xmlns:a14="http://schemas.microsoft.com/office/drawing/2010/main" val="0"/>
+              </a:ext>
+            </a:extLst>
+          </a:blip>
+          <a:srcRect/>
+          <a:stretch/>
+        </p:blipFill>
+        <p:spPr>
+          <a:xfrm>
+            <a:off x="6175715" y="110532"/>
+            <a:ext cx="5617029" cy="5617029"/>
+          </a:xfrm>
+          <a:prstGeom prst="rect">
+            <a:avLst/>
+          </a:prstGeom>
+        </p:spPr>
+      </p:pic>
+      <p:sp>
+        <p:nvSpPr>
+          <p:cNvPr id="5" name="TextBox 4">
+            <a:extLst>
+              <a:ext uri="{FF2B5EF4-FFF2-40B4-BE49-F238E27FC236}">
+                <a16:creationId xmlns:a16="http://schemas.microsoft.com/office/drawing/2014/main" id="{B7856085-290A-B372-8852-D03C82024C26}"/>
+              </a:ext>
+            </a:extLst>
+          </p:cNvPr>
+          <p:cNvSpPr txBox="1"/>
+          <p:nvPr/>
+        </p:nvSpPr>
+        <p:spPr>
+          <a:xfrm>
+            <a:off x="2090057" y="1848897"/>
+            <a:ext cx="1027845" cy="369332"/>
+          </a:xfrm>
+          <a:prstGeom prst="rect">
+            <a:avLst/>
+          </a:prstGeom>
+          <a:noFill/>
+        </p:spPr>
+        <p:txBody>
+          <a:bodyPr wrap="none" rtlCol="0">
+            <a:spAutoFit/>
+          </a:bodyPr>
+          <a:lstStyle/>
+          <a:p>
+            <a:r>
+              <a:rPr lang="en-US" dirty="0"/>
+              <a:t>Gaussian</a:t>
+            </a:r>
+          </a:p>
+        </p:txBody>
+      </p:sp>
+      <p:pic>
+        <p:nvPicPr>
+          <p:cNvPr id="3" name="Picture 2">
+            <a:extLst>
+              <a:ext uri="{FF2B5EF4-FFF2-40B4-BE49-F238E27FC236}">
+                <a16:creationId xmlns:a16="http://schemas.microsoft.com/office/drawing/2014/main" id="{56168612-D945-774C-B1DF-BBA398371C3A}"/>
+              </a:ext>
+            </a:extLst>
+          </p:cNvPr>
+          <p:cNvPicPr>
+            <a:picLocks noChangeAspect="1"/>
+          </p:cNvPicPr>
+          <p:nvPr/>
+        </p:nvPicPr>
+        <p:blipFill>
+          <a:blip r:embed="rId3"/>
+          <a:stretch>
+            <a:fillRect/>
+          </a:stretch>
+        </p:blipFill>
+        <p:spPr>
+          <a:xfrm>
+            <a:off x="122925" y="110532"/>
+            <a:ext cx="5757705" cy="5757705"/>
+          </a:xfrm>
+          <a:prstGeom prst="rect">
+            <a:avLst/>
+          </a:prstGeom>
+        </p:spPr>
+      </p:pic>
+    </p:spTree>
+    <p:extLst>
+      <p:ext uri="{BB962C8B-B14F-4D97-AF65-F5344CB8AC3E}">
+        <p14:creationId xmlns:p14="http://schemas.microsoft.com/office/powerpoint/2010/main" val="1765049063"/>
+      </p:ext>
+    </p:extLst>
+  </p:cSld>
+  <p:clrMapOvr>
+    <a:masterClrMapping/>
+  </p:clrMapOvr>
+</p:sld>
+</file>
+
 <file path=ppt/slides/slide2.xml><?xml version="1.0" encoding="utf-8"?>
+<p:sld xmlns:a="http://schemas.openxmlformats.org/drawingml/2006/main" xmlns:r="http://schemas.openxmlformats.org/officeDocument/2006/relationships" xmlns:p="http://schemas.openxmlformats.org/presentationml/2006/main">
+  <p:cSld>
+    <p:spTree>
+      <p:nvGrpSpPr>
+        <p:cNvPr id="1" name=""/>
+        <p:cNvGrpSpPr/>
+        <p:nvPr/>
+      </p:nvGrpSpPr>
+      <p:grpSpPr>
+        <a:xfrm>
+          <a:off x="0" y="0"/>
+          <a:ext cx="0" cy="0"/>
+          <a:chOff x="0" y="0"/>
+          <a:chExt cx="0" cy="0"/>
+        </a:xfrm>
+      </p:grpSpPr>
+      <p:sp>
+        <p:nvSpPr>
+          <p:cNvPr id="2" name="Title 1">
+            <a:extLst>
+              <a:ext uri="{FF2B5EF4-FFF2-40B4-BE49-F238E27FC236}">
+                <a16:creationId xmlns:a16="http://schemas.microsoft.com/office/drawing/2014/main" id="{AE494CCF-CA92-2700-40A3-004438792891}"/>
+              </a:ext>
+            </a:extLst>
+          </p:cNvPr>
+          <p:cNvSpPr>
+            <a:spLocks noGrp="1"/>
+          </p:cNvSpPr>
+          <p:nvPr>
+            <p:ph type="title"/>
+          </p:nvPr>
+        </p:nvSpPr>
+        <p:spPr>
+          <a:xfrm>
+            <a:off x="0" y="365126"/>
+            <a:ext cx="12192000" cy="466147"/>
+          </a:xfrm>
+        </p:spPr>
+        <p:txBody>
+          <a:bodyPr>
+            <a:noAutofit/>
+          </a:bodyPr>
+          <a:lstStyle/>
+          <a:p>
+            <a:pPr algn="ctr"/>
+            <a:r>
+              <a:rPr lang="en-US" sz="3600" b="1" dirty="0">
+                <a:latin typeface="+mj-lt"/>
+              </a:rPr>
+              <a:t>E</a:t>
+            </a:r>
+            <a:r>
+              <a:rPr lang="en-US" sz="3600" dirty="0">
+                <a:latin typeface="+mj-lt"/>
+              </a:rPr>
+              <a:t>nzyme </a:t>
+            </a:r>
+            <a:r>
+              <a:rPr lang="en-US" sz="3600" b="1" dirty="0">
+                <a:latin typeface="+mj-lt"/>
+              </a:rPr>
+              <a:t>l</a:t>
+            </a:r>
+            <a:r>
+              <a:rPr lang="en-US" sz="3600" dirty="0">
+                <a:latin typeface="+mj-lt"/>
+              </a:rPr>
+              <a:t>inked Immuno</a:t>
+            </a:r>
+            <a:r>
+              <a:rPr lang="en-US" sz="3600" b="1" dirty="0">
+                <a:latin typeface="+mj-lt"/>
+              </a:rPr>
+              <a:t>s</a:t>
+            </a:r>
+            <a:r>
+              <a:rPr lang="en-US" sz="3600" dirty="0">
+                <a:latin typeface="+mj-lt"/>
+              </a:rPr>
+              <a:t>orbent </a:t>
+            </a:r>
+            <a:r>
+              <a:rPr lang="en-US" sz="3600" b="1" dirty="0">
+                <a:latin typeface="+mj-lt"/>
+              </a:rPr>
+              <a:t>a</a:t>
+            </a:r>
+            <a:r>
+              <a:rPr lang="en-US" sz="3600" dirty="0">
+                <a:latin typeface="+mj-lt"/>
+              </a:rPr>
+              <a:t>ssay </a:t>
+            </a:r>
+            <a:r>
+              <a:rPr lang="pt-BR" sz="3600" dirty="0">
+                <a:latin typeface="+mj-lt"/>
+              </a:rPr>
+              <a:t>(</a:t>
+            </a:r>
+            <a:r>
+              <a:rPr lang="en-US" sz="3600" dirty="0"/>
+              <a:t>ELISA)</a:t>
+            </a:r>
+          </a:p>
+        </p:txBody>
+      </p:sp>
+      <p:sp>
+        <p:nvSpPr>
+          <p:cNvPr id="3" name="Slide Number Placeholder 2">
+            <a:extLst>
+              <a:ext uri="{FF2B5EF4-FFF2-40B4-BE49-F238E27FC236}">
+                <a16:creationId xmlns:a16="http://schemas.microsoft.com/office/drawing/2014/main" id="{421653A1-323E-A53C-0765-A352388732B6}"/>
+              </a:ext>
+            </a:extLst>
+          </p:cNvPr>
+          <p:cNvSpPr>
+            <a:spLocks noGrp="1"/>
+          </p:cNvSpPr>
+          <p:nvPr>
+            <p:ph type="sldNum" sz="quarter" idx="12"/>
+          </p:nvPr>
+        </p:nvSpPr>
+        <p:spPr/>
+        <p:txBody>
+          <a:bodyPr/>
+          <a:lstStyle/>
+          <a:p>
+            <a:fld id="{FB3EEA06-64CD-4E3F-A4B1-2F19568F86B8}" type="slidenum">
+              <a:rPr lang="en-US" smtClean="0"/>
+              <a:t>2</a:t>
+            </a:fld>
+            <a:endParaRPr lang="en-US"/>
+          </a:p>
+        </p:txBody>
+      </p:sp>
+      <p:sp>
+        <p:nvSpPr>
+          <p:cNvPr id="4" name="Content Placeholder 2">
+            <a:extLst>
+              <a:ext uri="{FF2B5EF4-FFF2-40B4-BE49-F238E27FC236}">
+                <a16:creationId xmlns:a16="http://schemas.microsoft.com/office/drawing/2014/main" id="{83825DBC-E62B-9CDC-322F-B0BA3E24C906}"/>
+              </a:ext>
+            </a:extLst>
+          </p:cNvPr>
+          <p:cNvSpPr txBox="1">
+            <a:spLocks/>
+          </p:cNvSpPr>
+          <p:nvPr/>
+        </p:nvSpPr>
+        <p:spPr>
+          <a:xfrm>
+            <a:off x="7010400" y="1293091"/>
+            <a:ext cx="4343400" cy="4969163"/>
+          </a:xfrm>
+          <a:prstGeom prst="rect">
+            <a:avLst/>
+          </a:prstGeom>
+        </p:spPr>
+        <p:txBody>
+          <a:bodyPr>
+            <a:normAutofit/>
+          </a:bodyPr>
+          <a:lstStyle>
+            <a:lvl1pPr marL="228600" indent="-228600" algn="l" defTabSz="914400" rtl="0" eaLnBrk="1" latinLnBrk="0" hangingPunct="1">
+              <a:lnSpc>
+                <a:spcPct val="90000"/>
+              </a:lnSpc>
+              <a:spcBef>
+                <a:spcPts val="1000"/>
+              </a:spcBef>
+              <a:buFont typeface="Arial" panose="020B0604020202020204" pitchFamily="34" charset="0"/>
+              <a:buChar char="•"/>
+              <a:defRPr sz="2800" kern="1200">
+                <a:solidFill>
+                  <a:schemeClr val="tx1"/>
+                </a:solidFill>
+                <a:latin typeface="+mn-lt"/>
+                <a:ea typeface="+mn-ea"/>
+                <a:cs typeface="+mn-cs"/>
+              </a:defRPr>
+            </a:lvl1pPr>
+            <a:lvl2pPr marL="685800" indent="-228600" algn="l" defTabSz="914400" rtl="0" eaLnBrk="1" latinLnBrk="0" hangingPunct="1">
+              <a:lnSpc>
+                <a:spcPct val="90000"/>
+              </a:lnSpc>
+              <a:spcBef>
+                <a:spcPts val="500"/>
+              </a:spcBef>
+              <a:buFont typeface="Arial" panose="020B0604020202020204" pitchFamily="34" charset="0"/>
+              <a:buChar char="•"/>
+              <a:defRPr sz="2400" kern="1200">
+                <a:solidFill>
+                  <a:schemeClr val="tx1"/>
+                </a:solidFill>
+                <a:latin typeface="+mn-lt"/>
+                <a:ea typeface="+mn-ea"/>
+                <a:cs typeface="+mn-cs"/>
+              </a:defRPr>
+            </a:lvl2pPr>
+            <a:lvl3pPr marL="1143000" indent="-228600" algn="l" defTabSz="914400" rtl="0" eaLnBrk="1" latinLnBrk="0" hangingPunct="1">
+              <a:lnSpc>
+                <a:spcPct val="90000"/>
+              </a:lnSpc>
+              <a:spcBef>
+                <a:spcPts val="500"/>
+              </a:spcBef>
+              <a:buFont typeface="Arial" panose="020B0604020202020204" pitchFamily="34" charset="0"/>
+              <a:buChar char="•"/>
+              <a:defRPr sz="2000" kern="1200">
+                <a:solidFill>
+                  <a:schemeClr val="tx1"/>
+                </a:solidFill>
+                <a:latin typeface="+mn-lt"/>
+                <a:ea typeface="+mn-ea"/>
+                <a:cs typeface="+mn-cs"/>
+              </a:defRPr>
+            </a:lvl3pPr>
+            <a:lvl4pPr marL="1600200" indent="-228600" algn="l" defTabSz="914400" rtl="0" eaLnBrk="1" latinLnBrk="0" hangingPunct="1">
+              <a:lnSpc>
+                <a:spcPct val="90000"/>
+              </a:lnSpc>
+              <a:spcBef>
+                <a:spcPts val="500"/>
+              </a:spcBef>
+              <a:buFont typeface="Arial" panose="020B0604020202020204" pitchFamily="34" charset="0"/>
+              <a:buChar char="•"/>
+              <a:defRPr sz="1800" kern="1200">
+                <a:solidFill>
+                  <a:schemeClr val="tx1"/>
+                </a:solidFill>
+                <a:latin typeface="+mn-lt"/>
+                <a:ea typeface="+mn-ea"/>
+                <a:cs typeface="+mn-cs"/>
+              </a:defRPr>
+            </a:lvl4pPr>
+            <a:lvl5pPr marL="2057400" indent="-228600" algn="l" defTabSz="914400" rtl="0" eaLnBrk="1" latinLnBrk="0" hangingPunct="1">
+              <a:lnSpc>
+                <a:spcPct val="90000"/>
+              </a:lnSpc>
+              <a:spcBef>
+                <a:spcPts val="500"/>
+              </a:spcBef>
+              <a:buFont typeface="Arial" panose="020B0604020202020204" pitchFamily="34" charset="0"/>
+              <a:buChar char="•"/>
+              <a:defRPr sz="1800" kern="1200">
+                <a:solidFill>
+                  <a:schemeClr val="tx1"/>
+                </a:solidFill>
+                <a:latin typeface="+mn-lt"/>
+                <a:ea typeface="+mn-ea"/>
+                <a:cs typeface="+mn-cs"/>
+              </a:defRPr>
+            </a:lvl5pPr>
+            <a:lvl6pPr marL="2514600" indent="-228600" algn="l" defTabSz="914400" rtl="0" eaLnBrk="1" latinLnBrk="0" hangingPunct="1">
+              <a:lnSpc>
+                <a:spcPct val="90000"/>
+              </a:lnSpc>
+              <a:spcBef>
+                <a:spcPts val="500"/>
+              </a:spcBef>
+              <a:buFont typeface="Arial" panose="020B0604020202020204" pitchFamily="34" charset="0"/>
+              <a:buChar char="•"/>
+              <a:defRPr sz="1800" kern="1200">
+                <a:solidFill>
+                  <a:schemeClr val="tx1"/>
+                </a:solidFill>
+                <a:latin typeface="+mn-lt"/>
+                <a:ea typeface="+mn-ea"/>
+                <a:cs typeface="+mn-cs"/>
+              </a:defRPr>
+            </a:lvl6pPr>
+            <a:lvl7pPr marL="2971800" indent="-228600" algn="l" defTabSz="914400" rtl="0" eaLnBrk="1" latinLnBrk="0" hangingPunct="1">
+              <a:lnSpc>
+                <a:spcPct val="90000"/>
+              </a:lnSpc>
+              <a:spcBef>
+                <a:spcPts val="500"/>
+              </a:spcBef>
+              <a:buFont typeface="Arial" panose="020B0604020202020204" pitchFamily="34" charset="0"/>
+              <a:buChar char="•"/>
+              <a:defRPr sz="1800" kern="1200">
+                <a:solidFill>
+                  <a:schemeClr val="tx1"/>
+                </a:solidFill>
+                <a:latin typeface="+mn-lt"/>
+                <a:ea typeface="+mn-ea"/>
+                <a:cs typeface="+mn-cs"/>
+              </a:defRPr>
+            </a:lvl7pPr>
+            <a:lvl8pPr marL="3429000" indent="-228600" algn="l" defTabSz="914400" rtl="0" eaLnBrk="1" latinLnBrk="0" hangingPunct="1">
+              <a:lnSpc>
+                <a:spcPct val="90000"/>
+              </a:lnSpc>
+              <a:spcBef>
+                <a:spcPts val="500"/>
+              </a:spcBef>
+              <a:buFont typeface="Arial" panose="020B0604020202020204" pitchFamily="34" charset="0"/>
+              <a:buChar char="•"/>
+              <a:defRPr sz="1800" kern="1200">
+                <a:solidFill>
+                  <a:schemeClr val="tx1"/>
+                </a:solidFill>
+                <a:latin typeface="+mn-lt"/>
+                <a:ea typeface="+mn-ea"/>
+                <a:cs typeface="+mn-cs"/>
+              </a:defRPr>
+            </a:lvl8pPr>
+            <a:lvl9pPr marL="3886200" indent="-228600" algn="l" defTabSz="914400" rtl="0" eaLnBrk="1" latinLnBrk="0" hangingPunct="1">
+              <a:lnSpc>
+                <a:spcPct val="90000"/>
+              </a:lnSpc>
+              <a:spcBef>
+                <a:spcPts val="500"/>
+              </a:spcBef>
+              <a:buFont typeface="Arial" panose="020B0604020202020204" pitchFamily="34" charset="0"/>
+              <a:buChar char="•"/>
+              <a:defRPr sz="1800" kern="1200">
+                <a:solidFill>
+                  <a:schemeClr val="tx1"/>
+                </a:solidFill>
+                <a:latin typeface="+mn-lt"/>
+                <a:ea typeface="+mn-ea"/>
+                <a:cs typeface="+mn-cs"/>
+              </a:defRPr>
+            </a:lvl9pPr>
+          </a:lstStyle>
+          <a:p>
+            <a:r>
+              <a:rPr lang="pt-BR" sz="2000" dirty="0">
+                <a:latin typeface="+mj-lt"/>
+              </a:rPr>
+              <a:t>122 samples: 38 non-COVID no-DM, 30 non-COVID DM, 35 COVID non-DM and 19 COVID DM</a:t>
+            </a:r>
+          </a:p>
+          <a:p>
+            <a:r>
+              <a:rPr lang="pt-BR" sz="2000" dirty="0">
+                <a:latin typeface="+mj-lt"/>
+              </a:rPr>
+              <a:t>21 proteins</a:t>
+            </a:r>
+          </a:p>
+        </p:txBody>
+      </p:sp>
+    </p:spTree>
+    <p:extLst>
+      <p:ext uri="{BB962C8B-B14F-4D97-AF65-F5344CB8AC3E}">
+        <p14:creationId xmlns:p14="http://schemas.microsoft.com/office/powerpoint/2010/main" val="783287949"/>
+      </p:ext>
+    </p:extLst>
+  </p:cSld>
+  <p:clrMapOvr>
+    <a:masterClrMapping/>
+  </p:clrMapOvr>
+</p:sld>
+</file>
+
+<file path=ppt/slides/slide3.xml><?xml version="1.0" encoding="utf-8"?>
 <p:sld xmlns:a="http://schemas.openxmlformats.org/drawingml/2006/main" xmlns:r="http://schemas.openxmlformats.org/officeDocument/2006/relationships" xmlns:p="http://schemas.openxmlformats.org/presentationml/2006/main">
   <p:cSld>
     <p:spTree>
@@ -4200,7 +5092,7 @@
           <a:p>
             <a:fld id="{FB3EEA06-64CD-4E3F-A4B1-2F19568F86B8}" type="slidenum">
               <a:rPr lang="en-US" smtClean="0"/>
-              <a:t>2</a:t>
+              <a:t>3</a:t>
             </a:fld>
             <a:endParaRPr lang="en-US"/>
           </a:p>
@@ -4219,7 +5111,7 @@
 </p:sld>
 </file>
 
-<file path=ppt/slides/slide3.xml><?xml version="1.0" encoding="utf-8"?>
+<file path=ppt/slides/slide4.xml><?xml version="1.0" encoding="utf-8"?>
 <p:sld xmlns:a="http://schemas.openxmlformats.org/drawingml/2006/main" xmlns:r="http://schemas.openxmlformats.org/officeDocument/2006/relationships" xmlns:p="http://schemas.openxmlformats.org/presentationml/2006/main">
   <p:cSld>
     <p:spTree>
@@ -4253,7 +5145,7 @@
           <a:p>
             <a:fld id="{FB3EEA06-64CD-4E3F-A4B1-2F19568F86B8}" type="slidenum">
               <a:rPr lang="en-US" smtClean="0"/>
-              <a:t>3</a:t>
+              <a:t>4</a:t>
             </a:fld>
             <a:endParaRPr lang="en-US"/>
           </a:p>
@@ -13873,365 +14765,6 @@
 </p:sld>
 </file>
 
-<file path=ppt/slides/slide4.xml><?xml version="1.0" encoding="utf-8"?>
-<p:sld xmlns:a="http://schemas.openxmlformats.org/drawingml/2006/main" xmlns:r="http://schemas.openxmlformats.org/officeDocument/2006/relationships" xmlns:p="http://schemas.openxmlformats.org/presentationml/2006/main">
-  <p:cSld>
-    <p:spTree>
-      <p:nvGrpSpPr>
-        <p:cNvPr id="1" name=""/>
-        <p:cNvGrpSpPr/>
-        <p:nvPr/>
-      </p:nvGrpSpPr>
-      <p:grpSpPr>
-        <a:xfrm>
-          <a:off x="0" y="0"/>
-          <a:ext cx="0" cy="0"/>
-          <a:chOff x="0" y="0"/>
-          <a:chExt cx="0" cy="0"/>
-        </a:xfrm>
-      </p:grpSpPr>
-      <p:sp>
-        <p:nvSpPr>
-          <p:cNvPr id="2" name="Title 1">
-            <a:extLst>
-              <a:ext uri="{FF2B5EF4-FFF2-40B4-BE49-F238E27FC236}">
-                <a16:creationId xmlns:a16="http://schemas.microsoft.com/office/drawing/2014/main" id="{761F2CFA-2AB8-020A-5DF6-624E934DFB61}"/>
-              </a:ext>
-            </a:extLst>
-          </p:cNvPr>
-          <p:cNvSpPr>
-            <a:spLocks noGrp="1"/>
-          </p:cNvSpPr>
-          <p:nvPr>
-            <p:ph type="title"/>
-          </p:nvPr>
-        </p:nvSpPr>
-        <p:spPr>
-          <a:xfrm>
-            <a:off x="838200" y="365126"/>
-            <a:ext cx="10515600" cy="660110"/>
-          </a:xfrm>
-        </p:spPr>
-        <p:txBody>
-          <a:bodyPr>
-            <a:normAutofit fontScale="90000"/>
-          </a:bodyPr>
-          <a:lstStyle/>
-          <a:p>
-            <a:pPr algn="ctr"/>
-            <a:r>
-              <a:rPr lang="en-US" dirty="0"/>
-              <a:t>Data Quality Control: Gene Expressions</a:t>
-            </a:r>
-          </a:p>
-        </p:txBody>
-      </p:sp>
-      <p:sp>
-        <p:nvSpPr>
-          <p:cNvPr id="3" name="Content Placeholder 2">
-            <a:extLst>
-              <a:ext uri="{FF2B5EF4-FFF2-40B4-BE49-F238E27FC236}">
-                <a16:creationId xmlns:a16="http://schemas.microsoft.com/office/drawing/2014/main" id="{90E4A2BD-A002-6A8B-78F1-F32936F59499}"/>
-              </a:ext>
-            </a:extLst>
-          </p:cNvPr>
-          <p:cNvSpPr>
-            <a:spLocks noGrp="1"/>
-          </p:cNvSpPr>
-          <p:nvPr>
-            <p:ph idx="1"/>
-          </p:nvPr>
-        </p:nvSpPr>
-        <p:spPr>
-          <a:xfrm>
-            <a:off x="838200" y="1293091"/>
-            <a:ext cx="10515600" cy="4969163"/>
-          </a:xfrm>
-        </p:spPr>
-        <p:txBody>
-          <a:bodyPr>
-            <a:normAutofit fontScale="70000" lnSpcReduction="20000"/>
-          </a:bodyPr>
-          <a:lstStyle/>
-          <a:p>
-            <a:r>
-              <a:rPr lang="en-US" dirty="0"/>
-              <a:t>“</a:t>
-            </a:r>
-            <a:r>
-              <a:rPr lang="en-US" i="1" dirty="0"/>
-              <a:t>gene_count.xls</a:t>
-            </a:r>
-            <a:r>
-              <a:rPr lang="en-US" dirty="0"/>
-              <a:t>” (57 samples) and “</a:t>
-            </a:r>
-            <a:r>
-              <a:rPr lang="en-US" i="1" dirty="0"/>
-              <a:t>gene_count_Additional.txt</a:t>
-            </a:r>
-            <a:r>
-              <a:rPr lang="en-US" dirty="0"/>
-              <a:t>” (45 samples) contain expression data of 58,735  transcripts, and 10 gene description columns. Hence, 102 samples.</a:t>
-            </a:r>
-          </a:p>
-          <a:p>
-            <a:r>
-              <a:rPr lang="en-US" b="1" dirty="0"/>
-              <a:t>NOTE 5 (9/19/2023): </a:t>
-            </a:r>
-            <a:r>
-              <a:rPr lang="en-US" dirty="0"/>
-              <a:t>in RNA-seq, some COVID patients are marked as non-COVID as COVID was detected later. Use clinical data labels for all data (“Study Group”)</a:t>
-            </a:r>
-          </a:p>
-          <a:p>
-            <a:pPr lvl="1"/>
-            <a:r>
-              <a:rPr lang="en-US" dirty="0">
-                <a:solidFill>
-                  <a:srgbClr val="FF0000"/>
-                </a:solidFill>
-              </a:rPr>
-              <a:t>Correct, they may have later come up positive </a:t>
-            </a:r>
-            <a:r>
-              <a:rPr lang="en-US" dirty="0">
-                <a:solidFill>
-                  <a:srgbClr val="00B050"/>
-                </a:solidFill>
-              </a:rPr>
-              <a:t>(OK)</a:t>
-            </a:r>
-          </a:p>
-          <a:p>
-            <a:r>
-              <a:rPr lang="en-US" dirty="0"/>
-              <a:t>The following 10 patients were found in RNA-seq data but not in clinical data: </a:t>
-            </a:r>
-            <a:r>
-              <a:rPr lang="pt-BR" dirty="0"/>
-              <a:t>464811,   507344,   7907555,  </a:t>
-            </a:r>
-            <a:r>
-              <a:rPr lang="pt-BR" dirty="0">
-                <a:solidFill>
-                  <a:srgbClr val="00B0F0"/>
-                </a:solidFill>
-              </a:rPr>
-              <a:t>05042447</a:t>
-            </a:r>
-            <a:r>
-              <a:rPr lang="pt-BR" dirty="0"/>
-              <a:t>,  </a:t>
-            </a:r>
-            <a:r>
-              <a:rPr lang="pt-BR" dirty="0">
-                <a:solidFill>
-                  <a:srgbClr val="00B0F0"/>
-                </a:solidFill>
-              </a:rPr>
-              <a:t>04886363</a:t>
-            </a:r>
-            <a:r>
-              <a:rPr lang="pt-BR" dirty="0"/>
-              <a:t>, </a:t>
-            </a:r>
-            <a:r>
-              <a:rPr lang="pt-BR" dirty="0">
-                <a:solidFill>
-                  <a:srgbClr val="00B0F0"/>
-                </a:solidFill>
-              </a:rPr>
-              <a:t>01379494</a:t>
-            </a:r>
-            <a:r>
-              <a:rPr lang="pt-BR" dirty="0"/>
-              <a:t>, </a:t>
-            </a:r>
-            <a:r>
-              <a:rPr lang="pt-BR" dirty="0">
-                <a:solidFill>
-                  <a:srgbClr val="00B0F0"/>
-                </a:solidFill>
-              </a:rPr>
-              <a:t>07215440a and 07215440b</a:t>
-            </a:r>
-            <a:r>
-              <a:rPr lang="pt-BR" dirty="0"/>
-              <a:t>, 75435 and 831760 </a:t>
-            </a:r>
-          </a:p>
-          <a:p>
-            <a:pPr lvl="1"/>
-            <a:r>
-              <a:rPr lang="pt-BR" dirty="0">
-                <a:solidFill>
-                  <a:srgbClr val="FF0000"/>
-                </a:solidFill>
-              </a:rPr>
-              <a:t>These match the samples from ELISA with no clinical data.  The lab may have included these </a:t>
-            </a:r>
-          </a:p>
-          <a:p>
-            <a:r>
-              <a:rPr lang="en-US" b="1" dirty="0"/>
-              <a:t>NOTE 6</a:t>
-            </a:r>
-            <a:r>
-              <a:rPr lang="en-US" dirty="0"/>
-              <a:t>: “Real ID” are used for linking all datasets</a:t>
-            </a:r>
-          </a:p>
-          <a:p>
-            <a:pPr lvl="1"/>
-            <a:r>
-              <a:rPr lang="en-US" dirty="0">
-                <a:solidFill>
-                  <a:srgbClr val="FF0000"/>
-                </a:solidFill>
-              </a:rPr>
-              <a:t>Correct </a:t>
-            </a:r>
-            <a:r>
-              <a:rPr lang="en-US" dirty="0">
-                <a:solidFill>
-                  <a:srgbClr val="00B050"/>
-                </a:solidFill>
-              </a:rPr>
-              <a:t>(OK)</a:t>
-            </a:r>
-            <a:endParaRPr lang="pt-BR" dirty="0">
-              <a:solidFill>
-                <a:srgbClr val="00B050"/>
-              </a:solidFill>
-            </a:endParaRPr>
-          </a:p>
-          <a:p>
-            <a:r>
-              <a:rPr lang="pt-BR" b="1" dirty="0"/>
-              <a:t>NOTE 7 </a:t>
-            </a:r>
-            <a:r>
-              <a:rPr lang="en-US" b="1" dirty="0"/>
-              <a:t>(9/19/2023):</a:t>
-            </a:r>
-            <a:r>
-              <a:rPr lang="pt-BR" dirty="0"/>
-              <a:t> Lu to check mismathced IDs as well as if </a:t>
-            </a:r>
-            <a:r>
-              <a:rPr lang="pt-BR" dirty="0">
-                <a:solidFill>
-                  <a:srgbClr val="00B0F0"/>
-                </a:solidFill>
-              </a:rPr>
-              <a:t>07215440a and 07215440b </a:t>
-            </a:r>
-            <a:r>
-              <a:rPr lang="pt-BR" dirty="0"/>
-              <a:t>were taken from the same patient.</a:t>
-            </a:r>
-          </a:p>
-          <a:p>
-            <a:pPr lvl="1"/>
-            <a:r>
-              <a:rPr lang="pt-BR" dirty="0">
-                <a:solidFill>
-                  <a:srgbClr val="FF0000"/>
-                </a:solidFill>
-              </a:rPr>
-              <a:t>Yes, same patient </a:t>
-            </a:r>
-            <a:r>
-              <a:rPr lang="pt-BR" dirty="0">
-                <a:solidFill>
-                  <a:srgbClr val="00B050"/>
-                </a:solidFill>
-              </a:rPr>
-              <a:t>(OK)</a:t>
-            </a:r>
-          </a:p>
-          <a:p>
-            <a:pPr lvl="1"/>
-            <a:r>
-              <a:rPr lang="pt-BR" dirty="0">
-                <a:solidFill>
-                  <a:srgbClr val="FF0000"/>
-                </a:solidFill>
-              </a:rPr>
-              <a:t>Which IDs are mismatched? </a:t>
-            </a:r>
-            <a:r>
-              <a:rPr lang="pt-BR" dirty="0">
-                <a:solidFill>
-                  <a:srgbClr val="00B050"/>
-                </a:solidFill>
-              </a:rPr>
-              <a:t>(I meant the 10 IDs above)</a:t>
-            </a:r>
-          </a:p>
-          <a:p>
-            <a:r>
-              <a:rPr lang="pt-BR" dirty="0"/>
-              <a:t>91 patients had no RNA-seq data.</a:t>
-            </a:r>
-          </a:p>
-          <a:p>
-            <a:pPr lvl="1"/>
-            <a:r>
-              <a:rPr lang="pt-BR" dirty="0">
-                <a:solidFill>
-                  <a:srgbClr val="FF0000"/>
-                </a:solidFill>
-              </a:rPr>
-              <a:t>That sounds correct, some of the samples were poor quality so could not get enough RNA exracted.</a:t>
-            </a:r>
-          </a:p>
-        </p:txBody>
-      </p:sp>
-      <p:sp>
-        <p:nvSpPr>
-          <p:cNvPr id="4" name="Slide Number Placeholder 3">
-            <a:extLst>
-              <a:ext uri="{FF2B5EF4-FFF2-40B4-BE49-F238E27FC236}">
-                <a16:creationId xmlns:a16="http://schemas.microsoft.com/office/drawing/2014/main" id="{5958290C-2DAA-3100-B919-311C5E983829}"/>
-              </a:ext>
-            </a:extLst>
-          </p:cNvPr>
-          <p:cNvSpPr>
-            <a:spLocks noGrp="1"/>
-          </p:cNvSpPr>
-          <p:nvPr>
-            <p:ph type="sldNum" sz="quarter" idx="12"/>
-          </p:nvPr>
-        </p:nvSpPr>
-        <p:spPr/>
-        <p:txBody>
-          <a:bodyPr/>
-          <a:lstStyle/>
-          <a:p>
-            <a:fld id="{FB3EEA06-64CD-4E3F-A4B1-2F19568F86B8}" type="slidenum">
-              <a:rPr lang="en-US" smtClean="0"/>
-              <a:t>4</a:t>
-            </a:fld>
-            <a:endParaRPr lang="en-US"/>
-          </a:p>
-        </p:txBody>
-      </p:sp>
-    </p:spTree>
-    <p:extLst>
-      <p:ext uri="{BB962C8B-B14F-4D97-AF65-F5344CB8AC3E}">
-        <p14:creationId xmlns:p14="http://schemas.microsoft.com/office/powerpoint/2010/main" val="3728997786"/>
-      </p:ext>
-    </p:extLst>
-  </p:cSld>
-  <p:clrMapOvr>
-    <a:masterClrMapping/>
-  </p:clrMapOvr>
-</p:sld>
-</file>
-
 <file path=ppt/slides/slide5.xml><?xml version="1.0" encoding="utf-8"?>
 <p:sld xmlns:a="http://schemas.openxmlformats.org/drawingml/2006/main" xmlns:r="http://schemas.openxmlformats.org/officeDocument/2006/relationships" xmlns:p="http://schemas.openxmlformats.org/presentationml/2006/main">
   <p:cSld>
@@ -14280,7 +14813,7 @@
             <a:pPr algn="ctr"/>
             <a:r>
               <a:rPr lang="en-US" dirty="0"/>
-              <a:t>Data Quality Control: Lab Work and Medications</a:t>
+              <a:t>Data Quality Control: Gene Expressions</a:t>
             </a:r>
           </a:p>
         </p:txBody>
@@ -14303,25 +14836,123 @@
         </p:nvSpPr>
         <p:spPr>
           <a:xfrm>
-            <a:off x="838200" y="1293092"/>
-            <a:ext cx="10515600" cy="4796624"/>
+            <a:off x="838200" y="1293091"/>
+            <a:ext cx="10515600" cy="4969163"/>
           </a:xfrm>
         </p:spPr>
         <p:txBody>
           <a:bodyPr>
-            <a:normAutofit fontScale="47500" lnSpcReduction="20000"/>
+            <a:normAutofit fontScale="70000" lnSpcReduction="20000"/>
           </a:bodyPr>
           <a:lstStyle/>
           <a:p>
             <a:r>
+              <a:rPr lang="en-US" dirty="0"/>
+              <a:t>“</a:t>
+            </a:r>
+            <a:r>
+              <a:rPr lang="en-US" i="1" dirty="0"/>
+              <a:t>gene_count.xls</a:t>
+            </a:r>
+            <a:r>
+              <a:rPr lang="en-US" dirty="0"/>
+              <a:t>” (57 samples) and “</a:t>
+            </a:r>
+            <a:r>
+              <a:rPr lang="en-US" i="1" dirty="0"/>
+              <a:t>gene_count_Additional.txt</a:t>
+            </a:r>
+            <a:r>
+              <a:rPr lang="en-US" dirty="0"/>
+              <a:t>” (45 samples) contain expression data of 58,735  transcripts, and 10 gene description columns. Hence, 102 samples.</a:t>
+            </a:r>
+          </a:p>
+          <a:p>
+            <a:r>
+              <a:rPr lang="en-US" b="1" dirty="0"/>
+              <a:t>NOTE 5 (9/19/2023): </a:t>
+            </a:r>
+            <a:r>
+              <a:rPr lang="en-US" dirty="0"/>
+              <a:t>in RNA-seq, some COVID patients are marked as non-COVID as COVID was detected later. Use clinical data labels for all data (“Study Group”)</a:t>
+            </a:r>
+          </a:p>
+          <a:p>
+            <a:pPr lvl="1"/>
+            <a:r>
+              <a:rPr lang="en-US" dirty="0">
+                <a:solidFill>
+                  <a:srgbClr val="FF0000"/>
+                </a:solidFill>
+              </a:rPr>
+              <a:t>Correct, they may have later come up positive </a:t>
+            </a:r>
+            <a:r>
+              <a:rPr lang="en-US" dirty="0">
+                <a:solidFill>
+                  <a:srgbClr val="00B050"/>
+                </a:solidFill>
+              </a:rPr>
+              <a:t>(OK)</a:t>
+            </a:r>
+          </a:p>
+          <a:p>
+            <a:r>
+              <a:rPr lang="en-US" dirty="0"/>
+              <a:t>The following 10 patients were found in RNA-seq data but not in clinical data: </a:t>
+            </a:r>
+            <a:r>
               <a:rPr lang="pt-BR" dirty="0"/>
-              <a:t>In the clinical data, the following labwork results are recorded: "HbA1c“, "Vit_D_level“, "ALT“, "AST“, "hs-CRP“, "CRP“, "Fibrinogen“, "D-Dimer“, "ESR“, "Ferritin“, "LDH“, "Lactic Acid“, "PCT“, "Glucose Lvl" , "Screat“</a:t>
-            </a:r>
-            <a:endParaRPr lang="pt-BR" dirty="0">
-              <a:solidFill>
-                <a:srgbClr val="FF0000"/>
-              </a:solidFill>
-            </a:endParaRPr>
+              <a:t>464811,   507344,   7907555,  </a:t>
+            </a:r>
+            <a:r>
+              <a:rPr lang="pt-BR" dirty="0">
+                <a:solidFill>
+                  <a:srgbClr val="00B0F0"/>
+                </a:solidFill>
+              </a:rPr>
+              <a:t>05042447</a:t>
+            </a:r>
+            <a:r>
+              <a:rPr lang="pt-BR" dirty="0"/>
+              <a:t>,  </a:t>
+            </a:r>
+            <a:r>
+              <a:rPr lang="pt-BR" dirty="0">
+                <a:solidFill>
+                  <a:srgbClr val="00B0F0"/>
+                </a:solidFill>
+              </a:rPr>
+              <a:t>04886363</a:t>
+            </a:r>
+            <a:r>
+              <a:rPr lang="pt-BR" dirty="0"/>
+              <a:t>, </a:t>
+            </a:r>
+            <a:r>
+              <a:rPr lang="pt-BR" dirty="0">
+                <a:solidFill>
+                  <a:srgbClr val="00B0F0"/>
+                </a:solidFill>
+              </a:rPr>
+              <a:t>01379494</a:t>
+            </a:r>
+            <a:r>
+              <a:rPr lang="pt-BR" dirty="0"/>
+              <a:t>, </a:t>
+            </a:r>
+            <a:r>
+              <a:rPr lang="pt-BR" dirty="0">
+                <a:solidFill>
+                  <a:srgbClr val="00B0F0"/>
+                </a:solidFill>
+              </a:rPr>
+              <a:t>07215440a and 07215440b</a:t>
+            </a:r>
+            <a:r>
+              <a:rPr lang="pt-BR" dirty="0"/>
+              <a:t>, 75435 and 831760 </a:t>
+            </a:r>
           </a:p>
           <a:p>
             <a:pPr lvl="1"/>
@@ -14331,14 +14962,67 @@
                   <a:srgbClr val="FF0000"/>
                 </a:solidFill>
               </a:rPr>
-              <a:t>Correct</a:t>
-            </a:r>
-            <a:endParaRPr lang="pt-BR" dirty="0"/>
-          </a:p>
-          <a:p>
+              <a:t>These match the samples from ELISA with no clinical data.  The lab may have included these </a:t>
+            </a:r>
+          </a:p>
+          <a:p>
+            <a:r>
+              <a:rPr lang="en-US" b="1" dirty="0"/>
+              <a:t>NOTE 6</a:t>
+            </a:r>
+            <a:r>
+              <a:rPr lang="en-US" dirty="0"/>
+              <a:t>: “Real ID” are used for linking all datasets</a:t>
+            </a:r>
+          </a:p>
+          <a:p>
+            <a:pPr lvl="1"/>
+            <a:r>
+              <a:rPr lang="en-US" dirty="0">
+                <a:solidFill>
+                  <a:srgbClr val="FF0000"/>
+                </a:solidFill>
+              </a:rPr>
+              <a:t>Correct </a:t>
+            </a:r>
+            <a:r>
+              <a:rPr lang="en-US" dirty="0">
+                <a:solidFill>
+                  <a:srgbClr val="00B050"/>
+                </a:solidFill>
+              </a:rPr>
+              <a:t>(OK)</a:t>
+            </a:r>
+            <a:endParaRPr lang="pt-BR" dirty="0">
+              <a:solidFill>
+                <a:srgbClr val="00B050"/>
+              </a:solidFill>
+            </a:endParaRPr>
+          </a:p>
+          <a:p>
+            <a:r>
+              <a:rPr lang="pt-BR" b="1" dirty="0"/>
+              <a:t>NOTE 7 </a:t>
+            </a:r>
+            <a:r>
+              <a:rPr lang="en-US" b="1" dirty="0"/>
+              <a:t>(9/19/2023):</a:t>
+            </a:r>
             <a:r>
               <a:rPr lang="pt-BR" dirty="0"/>
-              <a:t>There are values outside of limits of detection/limits of quantification (LOD/LOQ). It Table 1, currently these values were set to NA as I converted all values to numeric (i.e., nonnumeric values like “&gt;700” automatically became NA). We need to conver them to numeric but mark them as censored, and think how we will deal with themin the analyses.</a:t>
+              <a:t> Lu to check mismathced IDs as well as if </a:t>
+            </a:r>
+            <a:r>
+              <a:rPr lang="pt-BR" dirty="0">
+                <a:solidFill>
+                  <a:srgbClr val="00B0F0"/>
+                </a:solidFill>
+              </a:rPr>
+              <a:t>07215440a and 07215440b </a:t>
+            </a:r>
+            <a:r>
+              <a:rPr lang="pt-BR" dirty="0"/>
+              <a:t>were taken from the same patient.</a:t>
             </a:r>
           </a:p>
           <a:p>
@@ -14349,16 +15033,15 @@
                   <a:srgbClr val="FF0000"/>
                 </a:solidFill>
               </a:rPr>
-              <a:t>Would it help to provide the upper and lower limit of quantitation for each assay?</a:t>
-            </a:r>
-          </a:p>
-          <a:p>
-            <a:endParaRPr lang="pt-BR" dirty="0"/>
-          </a:p>
-          <a:p>
-            <a:r>
-              <a:rPr lang="pt-BR" dirty="0"/>
-              <a:t>The following medications were recorded: "tocilizumab“, "remdesivir“, "dexamethasone"                       "methylprednisolone“, "prednisone“, "hydrocortisone“, "azithromycin“, "hydroxychloroquine"                  "regeneron“, "ACEis“, "ARBs“, "ARNIs“, "Insulin“, "Metformin“, "Glimepiride"                         "Glipizide“, "Sitagliptin“, "Full Dose Anticoagulation“, "Prophylactic Anticoagulation"</a:t>
+              <a:t>Yes, same patient </a:t>
+            </a:r>
+            <a:r>
+              <a:rPr lang="pt-BR" dirty="0">
+                <a:solidFill>
+                  <a:srgbClr val="00B050"/>
+                </a:solidFill>
+              </a:rPr>
+              <a:t>(OK)</a:t>
             </a:r>
           </a:p>
           <a:p>
@@ -14369,13 +15052,21 @@
                   <a:srgbClr val="FF0000"/>
                 </a:solidFill>
               </a:rPr>
-              <a:t>Yes</a:t>
+              <a:t>Which IDs are mismatched? </a:t>
+            </a:r>
+            <a:r>
+              <a:rPr lang="pt-BR" dirty="0">
+                <a:solidFill>
+                  <a:srgbClr val="00B050"/>
+                </a:solidFill>
+              </a:rPr>
+              <a:t>(I meant the 10 IDs above)</a:t>
             </a:r>
           </a:p>
           <a:p>
             <a:r>
               <a:rPr lang="pt-BR" dirty="0"/>
-              <a:t>Medicatins most likely will need to be grouped into larger categories. We will work with Lu on that.</a:t>
+              <a:t>91 patients had no RNA-seq data.</a:t>
             </a:r>
           </a:p>
           <a:p>
@@ -14386,127 +15077,7 @@
                   <a:srgbClr val="FF0000"/>
                 </a:solidFill>
               </a:rPr>
-              <a:t>Corticosteroids (methylprednisone, prednisone, hydrocortisone)</a:t>
-            </a:r>
-          </a:p>
-          <a:p>
-            <a:pPr lvl="1"/>
-            <a:r>
-              <a:rPr lang="pt-BR" dirty="0">
-                <a:solidFill>
-                  <a:srgbClr val="FF0000"/>
-                </a:solidFill>
-              </a:rPr>
-              <a:t>RAAS agents (ACEi, ARBs, ARNIs)</a:t>
-            </a:r>
-          </a:p>
-          <a:p>
-            <a:pPr lvl="1"/>
-            <a:r>
-              <a:rPr lang="pt-BR" dirty="0">
-                <a:solidFill>
-                  <a:srgbClr val="FF0000"/>
-                </a:solidFill>
-              </a:rPr>
-              <a:t>Biguanides (metformin)</a:t>
-            </a:r>
-          </a:p>
-          <a:p>
-            <a:pPr lvl="1"/>
-            <a:r>
-              <a:rPr lang="pt-BR" dirty="0">
-                <a:solidFill>
-                  <a:srgbClr val="FF0000"/>
-                </a:solidFill>
-              </a:rPr>
-              <a:t>Sulfonylureas (glimepiride, glipizide)</a:t>
-            </a:r>
-          </a:p>
-          <a:p>
-            <a:pPr lvl="1"/>
-            <a:r>
-              <a:rPr lang="pt-BR" dirty="0">
-                <a:solidFill>
-                  <a:srgbClr val="FF0000"/>
-                </a:solidFill>
-              </a:rPr>
-              <a:t>DPP-IV (sitagliptin)</a:t>
-            </a:r>
-          </a:p>
-          <a:p>
-            <a:pPr lvl="1"/>
-            <a:r>
-              <a:rPr lang="pt-BR" dirty="0">
-                <a:solidFill>
-                  <a:srgbClr val="FF0000"/>
-                </a:solidFill>
-              </a:rPr>
-              <a:t>If needed could also condense biguanides, sulfonylureas, and DPP-IV agents into a oral hypoglcemic class.</a:t>
-            </a:r>
-          </a:p>
-          <a:p>
-            <a:pPr lvl="1"/>
-            <a:r>
-              <a:rPr lang="pt-BR" dirty="0">
-                <a:solidFill>
-                  <a:srgbClr val="FF0000"/>
-                </a:solidFill>
-              </a:rPr>
-              <a:t>Tocilizumab</a:t>
-            </a:r>
-          </a:p>
-          <a:p>
-            <a:pPr lvl="1"/>
-            <a:r>
-              <a:rPr lang="pt-BR" dirty="0">
-                <a:solidFill>
-                  <a:srgbClr val="FF0000"/>
-                </a:solidFill>
-              </a:rPr>
-              <a:t>Remdesivir</a:t>
-            </a:r>
-          </a:p>
-          <a:p>
-            <a:pPr lvl="1"/>
-            <a:r>
-              <a:rPr lang="pt-BR" dirty="0">
-                <a:solidFill>
-                  <a:srgbClr val="FF0000"/>
-                </a:solidFill>
-              </a:rPr>
-              <a:t>Anticoagulation (full dose and prophylactic dose)</a:t>
-            </a:r>
-          </a:p>
-          <a:p>
-            <a:pPr lvl="2"/>
-            <a:r>
-              <a:rPr lang="pt-BR" dirty="0">
-                <a:solidFill>
-                  <a:srgbClr val="FF0000"/>
-                </a:solidFill>
-              </a:rPr>
-              <a:t>I think we should keep them split out</a:t>
-            </a:r>
-          </a:p>
-          <a:p>
-            <a:r>
-              <a:rPr lang="pt-BR" b="1" dirty="0"/>
-              <a:t>QUESTION</a:t>
-            </a:r>
-            <a:r>
-              <a:rPr lang="pt-BR" dirty="0"/>
-              <a:t>: Can Lu get follow-up (30 or 90 days), death or readmission?</a:t>
-            </a:r>
-          </a:p>
-          <a:p>
-            <a:pPr lvl="1"/>
-            <a:r>
-              <a:rPr lang="pt-BR" dirty="0">
-                <a:solidFill>
-                  <a:srgbClr val="FF0000"/>
-                </a:solidFill>
-              </a:rPr>
-              <a:t>Yes, manual pull.  Will take a week or so.</a:t>
+              <a:t>That sounds correct, some of the samples were poor quality so could not get enough RNA exracted.</a:t>
             </a:r>
           </a:p>
         </p:txBody>
@@ -14543,7 +15114,7 @@
     </p:spTree>
     <p:extLst>
       <p:ext uri="{BB962C8B-B14F-4D97-AF65-F5344CB8AC3E}">
-        <p14:creationId xmlns:p14="http://schemas.microsoft.com/office/powerpoint/2010/main" val="1038125178"/>
+        <p14:creationId xmlns:p14="http://schemas.microsoft.com/office/powerpoint/2010/main" val="3728997786"/>
       </p:ext>
     </p:extLst>
   </p:cSld>
@@ -14601,6 +15172,327 @@
             <a:pPr algn="ctr"/>
             <a:r>
               <a:rPr lang="en-US" dirty="0"/>
+              <a:t>Data Quality Control: Lab Work and Medications</a:t>
+            </a:r>
+          </a:p>
+        </p:txBody>
+      </p:sp>
+      <p:sp>
+        <p:nvSpPr>
+          <p:cNvPr id="3" name="Content Placeholder 2">
+            <a:extLst>
+              <a:ext uri="{FF2B5EF4-FFF2-40B4-BE49-F238E27FC236}">
+                <a16:creationId xmlns:a16="http://schemas.microsoft.com/office/drawing/2014/main" id="{90E4A2BD-A002-6A8B-78F1-F32936F59499}"/>
+              </a:ext>
+            </a:extLst>
+          </p:cNvPr>
+          <p:cNvSpPr>
+            <a:spLocks noGrp="1"/>
+          </p:cNvSpPr>
+          <p:nvPr>
+            <p:ph idx="1"/>
+          </p:nvPr>
+        </p:nvSpPr>
+        <p:spPr>
+          <a:xfrm>
+            <a:off x="838200" y="1293092"/>
+            <a:ext cx="10515600" cy="4796624"/>
+          </a:xfrm>
+        </p:spPr>
+        <p:txBody>
+          <a:bodyPr>
+            <a:normAutofit fontScale="47500" lnSpcReduction="20000"/>
+          </a:bodyPr>
+          <a:lstStyle/>
+          <a:p>
+            <a:r>
+              <a:rPr lang="pt-BR" dirty="0"/>
+              <a:t>In the clinical data, the following labwork results are recorded: "HbA1c“, "Vit_D_level“, "ALT“, "AST“, "hs-CRP“, "CRP“, "Fibrinogen“, "D-Dimer“, "ESR“, "Ferritin“, "LDH“, "Lactic Acid“, "PCT“, "Glucose Lvl" , "Screat“</a:t>
+            </a:r>
+            <a:endParaRPr lang="pt-BR" dirty="0">
+              <a:solidFill>
+                <a:srgbClr val="FF0000"/>
+              </a:solidFill>
+            </a:endParaRPr>
+          </a:p>
+          <a:p>
+            <a:pPr lvl="1"/>
+            <a:r>
+              <a:rPr lang="pt-BR" dirty="0">
+                <a:solidFill>
+                  <a:srgbClr val="FF0000"/>
+                </a:solidFill>
+              </a:rPr>
+              <a:t>Correct</a:t>
+            </a:r>
+            <a:endParaRPr lang="pt-BR" dirty="0"/>
+          </a:p>
+          <a:p>
+            <a:r>
+              <a:rPr lang="pt-BR" dirty="0"/>
+              <a:t>There are values outside of limits of detection/limits of quantification (LOD/LOQ). It Table 1, currently these values were set to NA as I converted all values to numeric (i.e., nonnumeric values like “&gt;700” automatically became NA). We need to conver them to numeric but mark them as censored, and think how we will deal with themin the analyses.</a:t>
+            </a:r>
+          </a:p>
+          <a:p>
+            <a:pPr lvl="1"/>
+            <a:r>
+              <a:rPr lang="pt-BR" dirty="0">
+                <a:solidFill>
+                  <a:srgbClr val="FF0000"/>
+                </a:solidFill>
+              </a:rPr>
+              <a:t>Would it help to provide the upper and lower limit of quantitation for each assay?</a:t>
+            </a:r>
+          </a:p>
+          <a:p>
+            <a:endParaRPr lang="pt-BR" dirty="0"/>
+          </a:p>
+          <a:p>
+            <a:r>
+              <a:rPr lang="pt-BR" dirty="0"/>
+              <a:t>The following medications were recorded: "tocilizumab“, "remdesivir“, "dexamethasone"                       "methylprednisolone“, "prednisone“, "hydrocortisone“, "azithromycin“, "hydroxychloroquine"                  "regeneron“, "ACEis“, "ARBs“, "ARNIs“, "Insulin“, "Metformin“, "Glimepiride"                         "Glipizide“, "Sitagliptin“, "Full Dose Anticoagulation“, "Prophylactic Anticoagulation"</a:t>
+            </a:r>
+          </a:p>
+          <a:p>
+            <a:pPr lvl="1"/>
+            <a:r>
+              <a:rPr lang="pt-BR" dirty="0">
+                <a:solidFill>
+                  <a:srgbClr val="FF0000"/>
+                </a:solidFill>
+              </a:rPr>
+              <a:t>Yes</a:t>
+            </a:r>
+          </a:p>
+          <a:p>
+            <a:r>
+              <a:rPr lang="pt-BR" dirty="0"/>
+              <a:t>Medicatins most likely will need to be grouped into larger categories. We will work with Lu on that.</a:t>
+            </a:r>
+          </a:p>
+          <a:p>
+            <a:pPr lvl="1"/>
+            <a:r>
+              <a:rPr lang="pt-BR" dirty="0">
+                <a:solidFill>
+                  <a:srgbClr val="FF0000"/>
+                </a:solidFill>
+              </a:rPr>
+              <a:t>Corticosteroids (methylprednisone, prednisone, hydrocortisone)</a:t>
+            </a:r>
+          </a:p>
+          <a:p>
+            <a:pPr lvl="1"/>
+            <a:r>
+              <a:rPr lang="pt-BR" dirty="0">
+                <a:solidFill>
+                  <a:srgbClr val="FF0000"/>
+                </a:solidFill>
+              </a:rPr>
+              <a:t>RAAS agents (ACEi, ARBs, ARNIs)</a:t>
+            </a:r>
+          </a:p>
+          <a:p>
+            <a:pPr lvl="1"/>
+            <a:r>
+              <a:rPr lang="pt-BR" dirty="0">
+                <a:solidFill>
+                  <a:srgbClr val="FF0000"/>
+                </a:solidFill>
+              </a:rPr>
+              <a:t>Biguanides (metformin)</a:t>
+            </a:r>
+          </a:p>
+          <a:p>
+            <a:pPr lvl="1"/>
+            <a:r>
+              <a:rPr lang="pt-BR" dirty="0">
+                <a:solidFill>
+                  <a:srgbClr val="FF0000"/>
+                </a:solidFill>
+              </a:rPr>
+              <a:t>Sulfonylureas (glimepiride, glipizide)</a:t>
+            </a:r>
+          </a:p>
+          <a:p>
+            <a:pPr lvl="1"/>
+            <a:r>
+              <a:rPr lang="pt-BR" dirty="0">
+                <a:solidFill>
+                  <a:srgbClr val="FF0000"/>
+                </a:solidFill>
+              </a:rPr>
+              <a:t>DPP-IV (sitagliptin)</a:t>
+            </a:r>
+          </a:p>
+          <a:p>
+            <a:pPr lvl="1"/>
+            <a:r>
+              <a:rPr lang="pt-BR" dirty="0">
+                <a:solidFill>
+                  <a:srgbClr val="FF0000"/>
+                </a:solidFill>
+              </a:rPr>
+              <a:t>If needed could also condense biguanides, sulfonylureas, and DPP-IV agents into a oral hypoglcemic class.</a:t>
+            </a:r>
+          </a:p>
+          <a:p>
+            <a:pPr lvl="1"/>
+            <a:r>
+              <a:rPr lang="pt-BR" dirty="0">
+                <a:solidFill>
+                  <a:srgbClr val="FF0000"/>
+                </a:solidFill>
+              </a:rPr>
+              <a:t>Tocilizumab</a:t>
+            </a:r>
+          </a:p>
+          <a:p>
+            <a:pPr lvl="1"/>
+            <a:r>
+              <a:rPr lang="pt-BR" dirty="0">
+                <a:solidFill>
+                  <a:srgbClr val="FF0000"/>
+                </a:solidFill>
+              </a:rPr>
+              <a:t>Remdesivir</a:t>
+            </a:r>
+          </a:p>
+          <a:p>
+            <a:pPr lvl="1"/>
+            <a:r>
+              <a:rPr lang="pt-BR" dirty="0">
+                <a:solidFill>
+                  <a:srgbClr val="FF0000"/>
+                </a:solidFill>
+              </a:rPr>
+              <a:t>Anticoagulation (full dose and prophylactic dose)</a:t>
+            </a:r>
+          </a:p>
+          <a:p>
+            <a:pPr lvl="2"/>
+            <a:r>
+              <a:rPr lang="pt-BR" dirty="0">
+                <a:solidFill>
+                  <a:srgbClr val="FF0000"/>
+                </a:solidFill>
+              </a:rPr>
+              <a:t>I think we should keep them split out</a:t>
+            </a:r>
+          </a:p>
+          <a:p>
+            <a:r>
+              <a:rPr lang="pt-BR" b="1" dirty="0"/>
+              <a:t>QUESTION</a:t>
+            </a:r>
+            <a:r>
+              <a:rPr lang="pt-BR" dirty="0"/>
+              <a:t>: Can Lu get follow-up (30 or 90 days), death or readmission?</a:t>
+            </a:r>
+          </a:p>
+          <a:p>
+            <a:pPr lvl="1"/>
+            <a:r>
+              <a:rPr lang="pt-BR" dirty="0">
+                <a:solidFill>
+                  <a:srgbClr val="FF0000"/>
+                </a:solidFill>
+              </a:rPr>
+              <a:t>Yes, manual pull.  Will take a week or so.</a:t>
+            </a:r>
+          </a:p>
+        </p:txBody>
+      </p:sp>
+      <p:sp>
+        <p:nvSpPr>
+          <p:cNvPr id="4" name="Slide Number Placeholder 3">
+            <a:extLst>
+              <a:ext uri="{FF2B5EF4-FFF2-40B4-BE49-F238E27FC236}">
+                <a16:creationId xmlns:a16="http://schemas.microsoft.com/office/drawing/2014/main" id="{5958290C-2DAA-3100-B919-311C5E983829}"/>
+              </a:ext>
+            </a:extLst>
+          </p:cNvPr>
+          <p:cNvSpPr>
+            <a:spLocks noGrp="1"/>
+          </p:cNvSpPr>
+          <p:nvPr>
+            <p:ph type="sldNum" sz="quarter" idx="12"/>
+          </p:nvPr>
+        </p:nvSpPr>
+        <p:spPr/>
+        <p:txBody>
+          <a:bodyPr/>
+          <a:lstStyle/>
+          <a:p>
+            <a:fld id="{FB3EEA06-64CD-4E3F-A4B1-2F19568F86B8}" type="slidenum">
+              <a:rPr lang="en-US" smtClean="0"/>
+              <a:t>6</a:t>
+            </a:fld>
+            <a:endParaRPr lang="en-US"/>
+          </a:p>
+        </p:txBody>
+      </p:sp>
+    </p:spTree>
+    <p:extLst>
+      <p:ext uri="{BB962C8B-B14F-4D97-AF65-F5344CB8AC3E}">
+        <p14:creationId xmlns:p14="http://schemas.microsoft.com/office/powerpoint/2010/main" val="1038125178"/>
+      </p:ext>
+    </p:extLst>
+  </p:cSld>
+  <p:clrMapOvr>
+    <a:masterClrMapping/>
+  </p:clrMapOvr>
+</p:sld>
+</file>
+
+<file path=ppt/slides/slide7.xml><?xml version="1.0" encoding="utf-8"?>
+<p:sld xmlns:a="http://schemas.openxmlformats.org/drawingml/2006/main" xmlns:r="http://schemas.openxmlformats.org/officeDocument/2006/relationships" xmlns:p="http://schemas.openxmlformats.org/presentationml/2006/main">
+  <p:cSld>
+    <p:spTree>
+      <p:nvGrpSpPr>
+        <p:cNvPr id="1" name=""/>
+        <p:cNvGrpSpPr/>
+        <p:nvPr/>
+      </p:nvGrpSpPr>
+      <p:grpSpPr>
+        <a:xfrm>
+          <a:off x="0" y="0"/>
+          <a:ext cx="0" cy="0"/>
+          <a:chOff x="0" y="0"/>
+          <a:chExt cx="0" cy="0"/>
+        </a:xfrm>
+      </p:grpSpPr>
+      <p:sp>
+        <p:nvSpPr>
+          <p:cNvPr id="2" name="Title 1">
+            <a:extLst>
+              <a:ext uri="{FF2B5EF4-FFF2-40B4-BE49-F238E27FC236}">
+                <a16:creationId xmlns:a16="http://schemas.microsoft.com/office/drawing/2014/main" id="{761F2CFA-2AB8-020A-5DF6-624E934DFB61}"/>
+              </a:ext>
+            </a:extLst>
+          </p:cNvPr>
+          <p:cNvSpPr>
+            <a:spLocks noGrp="1"/>
+          </p:cNvSpPr>
+          <p:nvPr>
+            <p:ph type="title"/>
+          </p:nvPr>
+        </p:nvSpPr>
+        <p:spPr>
+          <a:xfrm>
+            <a:off x="838200" y="365126"/>
+            <a:ext cx="10515600" cy="660110"/>
+          </a:xfrm>
+        </p:spPr>
+        <p:txBody>
+          <a:bodyPr>
+            <a:normAutofit fontScale="90000"/>
+          </a:bodyPr>
+          <a:lstStyle/>
+          <a:p>
+            <a:pPr algn="ctr"/>
+            <a:r>
+              <a:rPr lang="en-US" dirty="0"/>
               <a:t>Death by COVID</a:t>
             </a:r>
           </a:p>
@@ -14667,7 +15559,7 @@
           <a:p>
             <a:fld id="{FB3EEA06-64CD-4E3F-A4B1-2F19568F86B8}" type="slidenum">
               <a:rPr lang="en-US" smtClean="0"/>
-              <a:t>6</a:t>
+              <a:t>7</a:t>
             </a:fld>
             <a:endParaRPr lang="en-US"/>
           </a:p>
@@ -15243,7 +16135,7 @@
 </p:sld>
 </file>
 
-<file path=ppt/slides/slide7.xml><?xml version="1.0" encoding="utf-8"?>
+<file path=ppt/slides/slide8.xml><?xml version="1.0" encoding="utf-8"?>
 <p:sld xmlns:a="http://schemas.openxmlformats.org/drawingml/2006/main" xmlns:r="http://schemas.openxmlformats.org/officeDocument/2006/relationships" xmlns:p="http://schemas.openxmlformats.org/presentationml/2006/main">
   <p:cSld>
     <p:spTree>
@@ -15357,7 +16249,7 @@
           <a:p>
             <a:fld id="{FB3EEA06-64CD-4E3F-A4B1-2F19568F86B8}" type="slidenum">
               <a:rPr lang="en-US" smtClean="0"/>
-              <a:t>7</a:t>
+              <a:t>8</a:t>
             </a:fld>
             <a:endParaRPr lang="en-US"/>
           </a:p>
@@ -15963,7 +16855,7 @@
 </p:sld>
 </file>
 
-<file path=ppt/slides/slide8.xml><?xml version="1.0" encoding="utf-8"?>
+<file path=ppt/slides/slide9.xml><?xml version="1.0" encoding="utf-8"?>
 <p:sld xmlns:a="http://schemas.openxmlformats.org/drawingml/2006/main" xmlns:r="http://schemas.openxmlformats.org/officeDocument/2006/relationships" xmlns:p="http://schemas.openxmlformats.org/presentationml/2006/main">
   <p:cSld>
     <p:spTree>
@@ -16077,7 +16969,7 @@
           <a:p>
             <a:fld id="{FB3EEA06-64CD-4E3F-A4B1-2F19568F86B8}" type="slidenum">
               <a:rPr lang="en-US" smtClean="0"/>
-              <a:t>8</a:t>
+              <a:t>9</a:t>
             </a:fld>
             <a:endParaRPr lang="en-US"/>
           </a:p>

</xml_diff>